<commit_message>
Renamed process to thread
</commit_message>
<xml_diff>
--- a/book/figures/states.pptx
+++ b/book/figures/states.pptx
@@ -197,7 +197,7 @@
           <a:p>
             <a:fld id="{CA6D6662-2E78-E749-AC74-8B6293A2273E}" type="datetimeFigureOut">
               <a:rPr lang="en-US" smtClean="0"/>
-              <a:t>6/19/20</a:t>
+              <a:t>12/26/20</a:t>
             </a:fld>
             <a:endParaRPr lang="en-US"/>
           </a:p>
@@ -695,7 +695,7 @@
           <a:p>
             <a:fld id="{04834100-F070-AD4C-B025-37E5903F439D}" type="datetimeFigureOut">
               <a:rPr lang="en-US" smtClean="0"/>
-              <a:t>6/19/20</a:t>
+              <a:t>12/26/20</a:t>
             </a:fld>
             <a:endParaRPr lang="en-US"/>
           </a:p>
@@ -893,7 +893,7 @@
           <a:p>
             <a:fld id="{04834100-F070-AD4C-B025-37E5903F439D}" type="datetimeFigureOut">
               <a:rPr lang="en-US" smtClean="0"/>
-              <a:t>6/19/20</a:t>
+              <a:t>12/26/20</a:t>
             </a:fld>
             <a:endParaRPr lang="en-US"/>
           </a:p>
@@ -1101,7 +1101,7 @@
           <a:p>
             <a:fld id="{04834100-F070-AD4C-B025-37E5903F439D}" type="datetimeFigureOut">
               <a:rPr lang="en-US" smtClean="0"/>
-              <a:t>6/19/20</a:t>
+              <a:t>12/26/20</a:t>
             </a:fld>
             <a:endParaRPr lang="en-US"/>
           </a:p>
@@ -1299,7 +1299,7 @@
           <a:p>
             <a:fld id="{04834100-F070-AD4C-B025-37E5903F439D}" type="datetimeFigureOut">
               <a:rPr lang="en-US" smtClean="0"/>
-              <a:t>6/19/20</a:t>
+              <a:t>12/26/20</a:t>
             </a:fld>
             <a:endParaRPr lang="en-US"/>
           </a:p>
@@ -1574,7 +1574,7 @@
           <a:p>
             <a:fld id="{04834100-F070-AD4C-B025-37E5903F439D}" type="datetimeFigureOut">
               <a:rPr lang="en-US" smtClean="0"/>
-              <a:t>6/19/20</a:t>
+              <a:t>12/26/20</a:t>
             </a:fld>
             <a:endParaRPr lang="en-US"/>
           </a:p>
@@ -1839,7 +1839,7 @@
           <a:p>
             <a:fld id="{04834100-F070-AD4C-B025-37E5903F439D}" type="datetimeFigureOut">
               <a:rPr lang="en-US" smtClean="0"/>
-              <a:t>6/19/20</a:t>
+              <a:t>12/26/20</a:t>
             </a:fld>
             <a:endParaRPr lang="en-US"/>
           </a:p>
@@ -2251,7 +2251,7 @@
           <a:p>
             <a:fld id="{04834100-F070-AD4C-B025-37E5903F439D}" type="datetimeFigureOut">
               <a:rPr lang="en-US" smtClean="0"/>
-              <a:t>6/19/20</a:t>
+              <a:t>12/26/20</a:t>
             </a:fld>
             <a:endParaRPr lang="en-US"/>
           </a:p>
@@ -2397,7 +2397,7 @@
           <a:p>
             <a:fld id="{04834100-F070-AD4C-B025-37E5903F439D}" type="datetimeFigureOut">
               <a:rPr lang="en-US" smtClean="0"/>
-              <a:t>6/19/20</a:t>
+              <a:t>12/26/20</a:t>
             </a:fld>
             <a:endParaRPr lang="en-US"/>
           </a:p>
@@ -2510,7 +2510,7 @@
           <a:p>
             <a:fld id="{04834100-F070-AD4C-B025-37E5903F439D}" type="datetimeFigureOut">
               <a:rPr lang="en-US" smtClean="0"/>
-              <a:t>6/19/20</a:t>
+              <a:t>12/26/20</a:t>
             </a:fld>
             <a:endParaRPr lang="en-US"/>
           </a:p>
@@ -2821,7 +2821,7 @@
           <a:p>
             <a:fld id="{04834100-F070-AD4C-B025-37E5903F439D}" type="datetimeFigureOut">
               <a:rPr lang="en-US" smtClean="0"/>
-              <a:t>6/19/20</a:t>
+              <a:t>12/26/20</a:t>
             </a:fld>
             <a:endParaRPr lang="en-US"/>
           </a:p>
@@ -3109,7 +3109,7 @@
           <a:p>
             <a:fld id="{04834100-F070-AD4C-B025-37E5903F439D}" type="datetimeFigureOut">
               <a:rPr lang="en-US" smtClean="0"/>
-              <a:t>6/19/20</a:t>
+              <a:t>12/26/20</a:t>
             </a:fld>
             <a:endParaRPr lang="en-US"/>
           </a:p>
@@ -3350,7 +3350,7 @@
           <a:p>
             <a:fld id="{04834100-F070-AD4C-B025-37E5903F439D}" type="datetimeFigureOut">
               <a:rPr lang="en-US" smtClean="0"/>
-              <a:t>6/19/20</a:t>
+              <a:t>12/26/20</a:t>
             </a:fld>
             <a:endParaRPr lang="en-US"/>
           </a:p>
@@ -3986,8 +3986,13 @@
             <a:pPr algn="ctr"/>
             <a:r>
               <a:rPr lang="en-US" dirty="0"/>
-              <a:t>States with at most one process</a:t>
-            </a:r>
+              <a:t>States with at most </a:t>
+            </a:r>
+            <a:r>
+              <a:rPr lang="en-US"/>
+              <a:t>one thread</a:t>
+            </a:r>
+            <a:endParaRPr lang="en-US" dirty="0"/>
           </a:p>
           <a:p>
             <a:pPr algn="ctr"/>
@@ -4256,8 +4261,8 @@
         </p:nvSpPr>
         <p:spPr>
           <a:xfrm>
-            <a:off x="8066570" y="4008070"/>
-            <a:ext cx="2607957" cy="923330"/>
+            <a:off x="8168809" y="4008070"/>
+            <a:ext cx="2403479" cy="923330"/>
           </a:xfrm>
           <a:prstGeom prst="rect">
             <a:avLst/>
@@ -4273,7 +4278,7 @@
             <a:pPr algn="ctr"/>
             <a:r>
               <a:rPr lang="en-US" dirty="0"/>
-              <a:t>States with two processes</a:t>
+              <a:t>States with two threads</a:t>
             </a:r>
           </a:p>
           <a:p>

</xml_diff>